<commit_message>
Add documentation and optimise code
</commit_message>
<xml_diff>
--- a/architecture/CQRS + AXON.pptx
+++ b/architecture/CQRS + AXON.pptx
@@ -20,8 +20,8 @@
     <p:sldId id="268" r:id="rId14"/>
     <p:sldId id="269" r:id="rId15"/>
     <p:sldId id="271" r:id="rId16"/>
-    <p:sldId id="272" r:id="rId17"/>
-    <p:sldId id="270" r:id="rId18"/>
+    <p:sldId id="270" r:id="rId17"/>
+    <p:sldId id="272" r:id="rId18"/>
   </p:sldIdLst>
   <p:sldSz cx="12192000" cy="6858000"/>
   <p:notesSz cx="6858000" cy="9144000"/>
@@ -275,7 +275,7 @@
           <a:p>
             <a:fld id="{1606081C-D230-4ED4-9C2F-E1FF72933656}" type="datetimeFigureOut">
               <a:rPr lang="en-US" smtClean="0"/>
-              <a:t>4/6/2023</a:t>
+              <a:t>4/7/2023</a:t>
             </a:fld>
             <a:endParaRPr lang="en-US"/>
           </a:p>
@@ -473,7 +473,7 @@
           <a:p>
             <a:fld id="{1606081C-D230-4ED4-9C2F-E1FF72933656}" type="datetimeFigureOut">
               <a:rPr lang="en-US" smtClean="0"/>
-              <a:t>4/6/2023</a:t>
+              <a:t>4/7/2023</a:t>
             </a:fld>
             <a:endParaRPr lang="en-US"/>
           </a:p>
@@ -681,7 +681,7 @@
           <a:p>
             <a:fld id="{1606081C-D230-4ED4-9C2F-E1FF72933656}" type="datetimeFigureOut">
               <a:rPr lang="en-US" smtClean="0"/>
-              <a:t>4/6/2023</a:t>
+              <a:t>4/7/2023</a:t>
             </a:fld>
             <a:endParaRPr lang="en-US"/>
           </a:p>
@@ -879,7 +879,7 @@
           <a:p>
             <a:fld id="{1606081C-D230-4ED4-9C2F-E1FF72933656}" type="datetimeFigureOut">
               <a:rPr lang="en-US" smtClean="0"/>
-              <a:t>4/6/2023</a:t>
+              <a:t>4/7/2023</a:t>
             </a:fld>
             <a:endParaRPr lang="en-US"/>
           </a:p>
@@ -1154,7 +1154,7 @@
           <a:p>
             <a:fld id="{1606081C-D230-4ED4-9C2F-E1FF72933656}" type="datetimeFigureOut">
               <a:rPr lang="en-US" smtClean="0"/>
-              <a:t>4/6/2023</a:t>
+              <a:t>4/7/2023</a:t>
             </a:fld>
             <a:endParaRPr lang="en-US"/>
           </a:p>
@@ -1419,7 +1419,7 @@
           <a:p>
             <a:fld id="{1606081C-D230-4ED4-9C2F-E1FF72933656}" type="datetimeFigureOut">
               <a:rPr lang="en-US" smtClean="0"/>
-              <a:t>4/6/2023</a:t>
+              <a:t>4/7/2023</a:t>
             </a:fld>
             <a:endParaRPr lang="en-US"/>
           </a:p>
@@ -1831,7 +1831,7 @@
           <a:p>
             <a:fld id="{1606081C-D230-4ED4-9C2F-E1FF72933656}" type="datetimeFigureOut">
               <a:rPr lang="en-US" smtClean="0"/>
-              <a:t>4/6/2023</a:t>
+              <a:t>4/7/2023</a:t>
             </a:fld>
             <a:endParaRPr lang="en-US"/>
           </a:p>
@@ -1972,7 +1972,7 @@
           <a:p>
             <a:fld id="{1606081C-D230-4ED4-9C2F-E1FF72933656}" type="datetimeFigureOut">
               <a:rPr lang="en-US" smtClean="0"/>
-              <a:t>4/6/2023</a:t>
+              <a:t>4/7/2023</a:t>
             </a:fld>
             <a:endParaRPr lang="en-US"/>
           </a:p>
@@ -2085,7 +2085,7 @@
           <a:p>
             <a:fld id="{1606081C-D230-4ED4-9C2F-E1FF72933656}" type="datetimeFigureOut">
               <a:rPr lang="en-US" smtClean="0"/>
-              <a:t>4/6/2023</a:t>
+              <a:t>4/7/2023</a:t>
             </a:fld>
             <a:endParaRPr lang="en-US"/>
           </a:p>
@@ -2396,7 +2396,7 @@
           <a:p>
             <a:fld id="{1606081C-D230-4ED4-9C2F-E1FF72933656}" type="datetimeFigureOut">
               <a:rPr lang="en-US" smtClean="0"/>
-              <a:t>4/6/2023</a:t>
+              <a:t>4/7/2023</a:t>
             </a:fld>
             <a:endParaRPr lang="en-US"/>
           </a:p>
@@ -2684,7 +2684,7 @@
           <a:p>
             <a:fld id="{1606081C-D230-4ED4-9C2F-E1FF72933656}" type="datetimeFigureOut">
               <a:rPr lang="en-US" smtClean="0"/>
-              <a:t>4/6/2023</a:t>
+              <a:t>4/7/2023</a:t>
             </a:fld>
             <a:endParaRPr lang="en-US"/>
           </a:p>
@@ -2925,7 +2925,7 @@
           <a:p>
             <a:fld id="{1606081C-D230-4ED4-9C2F-E1FF72933656}" type="datetimeFigureOut">
               <a:rPr lang="en-US" smtClean="0"/>
-              <a:t>4/6/2023</a:t>
+              <a:t>4/7/2023</a:t>
             </a:fld>
             <a:endParaRPr lang="en-US"/>
           </a:p>
@@ -5208,7 +5208,7 @@
           <p:cNvPr id="2" name="Title 1">
             <a:extLst>
               <a:ext uri="{FF2B5EF4-FFF2-40B4-BE49-F238E27FC236}">
-                <a16:creationId xmlns:a16="http://schemas.microsoft.com/office/drawing/2014/main" id="{44FCF2BA-25B5-FF31-8FF4-E94487611731}"/>
+                <a16:creationId xmlns:a16="http://schemas.microsoft.com/office/drawing/2014/main" id="{77192C8E-326D-D52E-06CC-E3F224CC1D50}"/>
               </a:ext>
             </a:extLst>
           </p:cNvPr>
@@ -5219,33 +5219,112 @@
             <p:ph type="title"/>
           </p:nvPr>
         </p:nvSpPr>
-        <p:spPr>
-          <a:xfrm>
-            <a:off x="2249298" y="2766218"/>
-            <a:ext cx="7693404" cy="1325563"/>
-          </a:xfrm>
-        </p:spPr>
+        <p:spPr/>
+        <p:txBody>
+          <a:bodyPr/>
+          <a:lstStyle/>
+          <a:p>
+            <a:pPr algn="ctr"/>
+            <a:r>
+              <a:rPr lang="en-US" dirty="0"/>
+              <a:t>AXON</a:t>
+            </a:r>
+          </a:p>
+        </p:txBody>
+      </p:sp>
+      <p:sp>
+        <p:nvSpPr>
+          <p:cNvPr id="3" name="Content Placeholder 2">
+            <a:extLst>
+              <a:ext uri="{FF2B5EF4-FFF2-40B4-BE49-F238E27FC236}">
+                <a16:creationId xmlns:a16="http://schemas.microsoft.com/office/drawing/2014/main" id="{98E9D00B-5A32-ADB8-5EED-DE08DC37DD8D}"/>
+              </a:ext>
+            </a:extLst>
+          </p:cNvPr>
+          <p:cNvSpPr>
+            <a:spLocks noGrp="1"/>
+          </p:cNvSpPr>
+          <p:nvPr>
+            <p:ph idx="1"/>
+          </p:nvPr>
+        </p:nvSpPr>
+        <p:spPr/>
         <p:txBody>
           <a:bodyPr>
-            <a:noAutofit/>
+            <a:normAutofit lnSpcReduction="10000"/>
           </a:bodyPr>
           <a:lstStyle/>
           <a:p>
             <a:r>
-              <a:rPr lang="en-US" sz="9600" b="1" dirty="0">
+              <a:rPr lang="en-US" dirty="0"/>
+              <a:t>Axon - is one of the few frameworks that allow you to create flexible microservice solutions using the Event Sourcing and CQRS architectural patterns.</a:t>
+            </a:r>
+          </a:p>
+          <a:p>
+            <a:r>
+              <a:rPr lang="en-US" b="0" i="0" dirty="0">
                 <a:solidFill>
-                  <a:srgbClr val="FF0000"/>
+                  <a:srgbClr val="000000"/>
                 </a:solidFill>
+                <a:effectLst/>
               </a:rPr>
-              <a:t>NOT USE CQRS</a:t>
-            </a:r>
+              <a:t>Event Sourcing </a:t>
+            </a:r>
+            <a:r>
+              <a:rPr lang="en-US" b="1" i="0" dirty="0">
+                <a:solidFill>
+                  <a:srgbClr val="000000"/>
+                </a:solidFill>
+                <a:effectLst/>
+              </a:rPr>
+              <a:t>gives us a new way of persisting application state as an ordered sequence of events</a:t>
+            </a:r>
+            <a:r>
+              <a:rPr lang="en-US" b="0" i="0" dirty="0">
+                <a:solidFill>
+                  <a:srgbClr val="000000"/>
+                </a:solidFill>
+                <a:effectLst/>
+              </a:rPr>
+              <a:t>. We can selectively query these events and reconstruct the state of the application at any point in time. Of course, to make this work, we need to reimage every change to the state of the application as events.</a:t>
+            </a:r>
+          </a:p>
+          <a:p>
+            <a:r>
+              <a:rPr lang="en-US" b="0" i="0" dirty="0">
+                <a:solidFill>
+                  <a:srgbClr val="000000"/>
+                </a:solidFill>
+                <a:effectLst/>
+              </a:rPr>
+              <a:t>These events here </a:t>
+            </a:r>
+            <a:r>
+              <a:rPr lang="en-US" b="1" i="0" dirty="0">
+                <a:solidFill>
+                  <a:srgbClr val="000000"/>
+                </a:solidFill>
+                <a:effectLst/>
+              </a:rPr>
+              <a:t>are facts that have happened and can not be altered</a:t>
+            </a:r>
+            <a:r>
+              <a:rPr lang="en-US" b="0" i="0" dirty="0">
+                <a:solidFill>
+                  <a:srgbClr val="000000"/>
+                </a:solidFill>
+                <a:effectLst/>
+              </a:rPr>
+              <a:t> — in other words, they must be immutable. Recreating the application state is just a matter of replaying all the events.</a:t>
+            </a:r>
+            <a:endParaRPr lang="en-US" dirty="0"/>
           </a:p>
         </p:txBody>
       </p:sp>
     </p:spTree>
     <p:extLst>
       <p:ext uri="{BB962C8B-B14F-4D97-AF65-F5344CB8AC3E}">
-        <p14:creationId xmlns:p14="http://schemas.microsoft.com/office/powerpoint/2010/main" val="2825915747"/>
+        <p14:creationId xmlns:p14="http://schemas.microsoft.com/office/powerpoint/2010/main" val="3659083308"/>
       </p:ext>
     </p:extLst>
   </p:cSld>
@@ -5277,7 +5356,7 @@
           <p:cNvPr id="2" name="Title 1">
             <a:extLst>
               <a:ext uri="{FF2B5EF4-FFF2-40B4-BE49-F238E27FC236}">
-                <a16:creationId xmlns:a16="http://schemas.microsoft.com/office/drawing/2014/main" id="{77192C8E-326D-D52E-06CC-E3F224CC1D50}"/>
+                <a16:creationId xmlns:a16="http://schemas.microsoft.com/office/drawing/2014/main" id="{44FCF2BA-25B5-FF31-8FF4-E94487611731}"/>
               </a:ext>
             </a:extLst>
           </p:cNvPr>
@@ -5288,112 +5367,73 @@
             <p:ph type="title"/>
           </p:nvPr>
         </p:nvSpPr>
-        <p:spPr/>
-        <p:txBody>
-          <a:bodyPr/>
+        <p:spPr>
+          <a:xfrm>
+            <a:off x="2249297" y="2766218"/>
+            <a:ext cx="7693404" cy="1325563"/>
+          </a:xfrm>
+        </p:spPr>
+        <p:txBody>
+          <a:bodyPr>
+            <a:noAutofit/>
+          </a:bodyPr>
+          <a:lstStyle/>
+          <a:p>
+            <a:r>
+              <a:rPr lang="en-US" sz="9600" b="1" dirty="0">
+                <a:solidFill>
+                  <a:srgbClr val="FF0000"/>
+                </a:solidFill>
+              </a:rPr>
+              <a:t>NOT USE CQRS</a:t>
+            </a:r>
+          </a:p>
+        </p:txBody>
+      </p:sp>
+      <p:sp>
+        <p:nvSpPr>
+          <p:cNvPr id="3" name="TextBox 2">
+            <a:extLst>
+              <a:ext uri="{FF2B5EF4-FFF2-40B4-BE49-F238E27FC236}">
+                <a16:creationId xmlns:a16="http://schemas.microsoft.com/office/drawing/2014/main" id="{01EEF0F8-6C02-11A5-9694-50D535FDA303}"/>
+              </a:ext>
+            </a:extLst>
+          </p:cNvPr>
+          <p:cNvSpPr txBox="1"/>
+          <p:nvPr/>
+        </p:nvSpPr>
+        <p:spPr>
+          <a:xfrm>
+            <a:off x="4780383" y="6120882"/>
+            <a:ext cx="2631233" cy="369332"/>
+          </a:xfrm>
+          <a:prstGeom prst="rect">
+            <a:avLst/>
+          </a:prstGeom>
+          <a:noFill/>
+        </p:spPr>
+        <p:txBody>
+          <a:bodyPr wrap="square" rtlCol="0">
+            <a:spAutoFit/>
+          </a:bodyPr>
           <a:lstStyle/>
           <a:p>
             <a:pPr algn="ctr"/>
             <a:r>
-              <a:rPr lang="en-US" dirty="0"/>
-              <a:t>AXON</a:t>
-            </a:r>
-          </a:p>
-        </p:txBody>
-      </p:sp>
-      <p:sp>
-        <p:nvSpPr>
-          <p:cNvPr id="3" name="Content Placeholder 2">
-            <a:extLst>
-              <a:ext uri="{FF2B5EF4-FFF2-40B4-BE49-F238E27FC236}">
-                <a16:creationId xmlns:a16="http://schemas.microsoft.com/office/drawing/2014/main" id="{98E9D00B-5A32-ADB8-5EED-DE08DC37DD8D}"/>
-              </a:ext>
-            </a:extLst>
-          </p:cNvPr>
-          <p:cNvSpPr>
-            <a:spLocks noGrp="1"/>
-          </p:cNvSpPr>
-          <p:nvPr>
-            <p:ph idx="1"/>
-          </p:nvPr>
-        </p:nvSpPr>
-        <p:spPr/>
-        <p:txBody>
-          <a:bodyPr>
-            <a:normAutofit lnSpcReduction="10000"/>
-          </a:bodyPr>
-          <a:lstStyle/>
-          <a:p>
-            <a:r>
-              <a:rPr lang="en-US" dirty="0"/>
-              <a:t>Axon - is one of the few frameworks that allow you to create flexible microservice solutions using the Event Sourcing and CQRS architectural patterns.</a:t>
-            </a:r>
-          </a:p>
-          <a:p>
-            <a:r>
-              <a:rPr lang="en-US" b="0" i="0" dirty="0">
+              <a:rPr lang="en-US" dirty="0">
                 <a:solidFill>
-                  <a:srgbClr val="000000"/>
+                  <a:srgbClr val="FF0000"/>
                 </a:solidFill>
-                <a:effectLst/>
               </a:rPr>
-              <a:t>Event Sourcing </a:t>
-            </a:r>
-            <a:r>
-              <a:rPr lang="en-US" b="1" i="0" dirty="0">
-                <a:solidFill>
-                  <a:srgbClr val="000000"/>
-                </a:solidFill>
-                <a:effectLst/>
-              </a:rPr>
-              <a:t>gives us a new way of persisting application state as an ordered sequence of events</a:t>
-            </a:r>
-            <a:r>
-              <a:rPr lang="en-US" b="0" i="0" dirty="0">
-                <a:solidFill>
-                  <a:srgbClr val="000000"/>
-                </a:solidFill>
-                <a:effectLst/>
-              </a:rPr>
-              <a:t>. We can selectively query these events and reconstruct the state of the application at any point in time. Of course, to make this work, we need to reimage every change to the state of the application as events.</a:t>
-            </a:r>
-          </a:p>
-          <a:p>
-            <a:r>
-              <a:rPr lang="en-US" b="0" i="0" dirty="0">
-                <a:solidFill>
-                  <a:srgbClr val="000000"/>
-                </a:solidFill>
-                <a:effectLst/>
-              </a:rPr>
-              <a:t>These events here </a:t>
-            </a:r>
-            <a:r>
-              <a:rPr lang="en-US" b="1" i="0" dirty="0">
-                <a:solidFill>
-                  <a:srgbClr val="000000"/>
-                </a:solidFill>
-                <a:effectLst/>
-              </a:rPr>
-              <a:t>are facts that have happened and can not be altered</a:t>
-            </a:r>
-            <a:r>
-              <a:rPr lang="en-US" b="0" i="0" dirty="0">
-                <a:solidFill>
-                  <a:srgbClr val="000000"/>
-                </a:solidFill>
-                <a:effectLst/>
-              </a:rPr>
-              <a:t> — in other words, they must be immutable. Recreating the application state is just a matter of replaying all the events.</a:t>
-            </a:r>
-            <a:endParaRPr lang="en-US" dirty="0"/>
+              <a:t>everywhere</a:t>
+            </a:r>
           </a:p>
         </p:txBody>
       </p:sp>
     </p:spTree>
     <p:extLst>
       <p:ext uri="{BB962C8B-B14F-4D97-AF65-F5344CB8AC3E}">
-        <p14:creationId xmlns:p14="http://schemas.microsoft.com/office/powerpoint/2010/main" val="3659083308"/>
+        <p14:creationId xmlns:p14="http://schemas.microsoft.com/office/powerpoint/2010/main" val="2825915747"/>
       </p:ext>
     </p:extLst>
   </p:cSld>

</xml_diff>